<commit_message>
minor correction in sequence diagram
</commit_message>
<xml_diff>
--- a/docs/diagrams/ConsistencyCheckSequenceDiagram.pptx
+++ b/docs/diagrams/ConsistencyCheckSequenceDiagram.pptx
@@ -6069,47 +6069,6 @@
             <a:r>
               <a:rPr lang="en-US" sz="1000" dirty="0"/>
               <a:t> throws an exception in this case </a:t>
-            </a:r>
-          </a:p>
-        </p:txBody>
-      </p:sp>
-      <p:sp>
-        <p:nvSpPr>
-          <p:cNvPr id="155" name="TextBox 154">
-            <a:extLst>
-              <a:ext uri="{FF2B5EF4-FFF2-40B4-BE49-F238E27FC236}">
-                <a16:creationId xmlns:a16="http://schemas.microsoft.com/office/drawing/2014/main" id="{82C46533-6EB8-4953-BE46-36D686C78B4E}"/>
-              </a:ext>
-            </a:extLst>
-          </p:cNvPr>
-          <p:cNvSpPr txBox="1"/>
-          <p:nvPr/>
-        </p:nvSpPr>
-        <p:spPr>
-          <a:xfrm>
-            <a:off x="4075235" y="3205550"/>
-            <a:ext cx="572964" cy="276999"/>
-          </a:xfrm>
-          <a:prstGeom prst="rect">
-            <a:avLst/>
-          </a:prstGeom>
-          <a:noFill/>
-        </p:spPr>
-        <p:txBody>
-          <a:bodyPr wrap="square" rtlCol="0">
-            <a:spAutoFit/>
-          </a:bodyPr>
-          <a:lstStyle/>
-          <a:p>
-            <a:r>
-              <a:rPr lang="en-US" sz="1200" b="1" dirty="0">
-                <a:solidFill>
-                  <a:srgbClr val="7030A0"/>
-                </a:solidFill>
-                <a:cs typeface="Calibri"/>
-                <a:sym typeface="Calibri"/>
-              </a:rPr>
-              <a:t>alt</a:t>
             </a:r>
           </a:p>
         </p:txBody>

</xml_diff>